<commit_message>
Design Change & Content Added
</commit_message>
<xml_diff>
--- a/1st_presentation_20170454.pptx
+++ b/1st_presentation_20170454.pptx
@@ -7,7 +7,9 @@
   <p:sldIdLst>
     <p:sldId id="256" r:id="rId2"/>
     <p:sldId id="257" r:id="rId3"/>
-    <p:sldId id="258" r:id="rId4"/>
+    <p:sldId id="259" r:id="rId4"/>
+    <p:sldId id="260" r:id="rId5"/>
+    <p:sldId id="258" r:id="rId6"/>
   </p:sldIdLst>
   <p:sldSz cx="12192000" cy="6858000"/>
   <p:notesSz cx="6858000" cy="9144000"/>
@@ -106,6 +108,11 @@
       </a:defRPr>
     </a:lvl9pPr>
   </p:defaultTextStyle>
+  <p:extLst>
+    <p:ext uri="{EFAFB233-063F-42B5-8137-9DF3F51BA10A}">
+      <p15:sldGuideLst xmlns:p15="http://schemas.microsoft.com/office/powerpoint/2012/main"/>
+    </p:ext>
+  </p:extLst>
 </p:presentation>
 </file>
 
@@ -3313,6 +3320,14 @@
 <file path=ppt/slides/slide1.xml><?xml version="1.0" encoding="utf-8"?>
 <p:sld xmlns:a="http://schemas.openxmlformats.org/drawingml/2006/main" xmlns:r="http://schemas.openxmlformats.org/officeDocument/2006/relationships" xmlns:p="http://schemas.openxmlformats.org/presentationml/2006/main">
   <p:cSld>
+    <p:bg>
+      <p:bgPr>
+        <a:solidFill>
+          <a:schemeClr val="tx1"/>
+        </a:solidFill>
+        <a:effectLst/>
+      </p:bgPr>
+    </p:bg>
     <p:spTree>
       <p:nvGrpSpPr>
         <p:cNvPr id="1" name=""/>
@@ -3349,11 +3364,19 @@
           <a:lstStyle/>
           <a:p>
             <a:r>
-              <a:rPr lang="en-US" altLang="ko-KR" dirty="0"/>
+              <a:rPr lang="en-US" altLang="ko-KR" dirty="0">
+                <a:solidFill>
+                  <a:schemeClr val="bg1"/>
+                </a:solidFill>
+              </a:rPr>
               <a:t>1</a:t>
             </a:r>
             <a:r>
-              <a:rPr lang="ko-KR" altLang="en-US" dirty="0"/>
+              <a:rPr lang="ko-KR" altLang="en-US" dirty="0">
+                <a:solidFill>
+                  <a:schemeClr val="bg1"/>
+                </a:solidFill>
+              </a:rPr>
               <a:t>차 프레젠테이션</a:t>
             </a:r>
           </a:p>
@@ -3377,15 +3400,25 @@
         </p:nvSpPr>
         <p:spPr/>
         <p:txBody>
-          <a:bodyPr/>
-          <a:lstStyle/>
-          <a:p>
-            <a:r>
-              <a:rPr lang="en-US" altLang="ko-KR" dirty="0"/>
+          <a:bodyPr>
+            <a:normAutofit/>
+          </a:bodyPr>
+          <a:lstStyle/>
+          <a:p>
+            <a:r>
+              <a:rPr lang="en-US" altLang="ko-KR" sz="3200" dirty="0">
+                <a:solidFill>
+                  <a:schemeClr val="bg1"/>
+                </a:solidFill>
+              </a:rPr>
               <a:t>20170454 </a:t>
             </a:r>
             <a:r>
-              <a:rPr lang="ko-KR" altLang="en-US" dirty="0"/>
+              <a:rPr lang="ko-KR" altLang="en-US" sz="3200" dirty="0">
+                <a:solidFill>
+                  <a:schemeClr val="bg1"/>
+                </a:solidFill>
+              </a:rPr>
               <a:t>이창민</a:t>
             </a:r>
           </a:p>
@@ -3407,6 +3440,14 @@
 <file path=ppt/slides/slide2.xml><?xml version="1.0" encoding="utf-8"?>
 <p:sld xmlns:a="http://schemas.openxmlformats.org/drawingml/2006/main" xmlns:r="http://schemas.openxmlformats.org/officeDocument/2006/relationships" xmlns:p="http://schemas.openxmlformats.org/presentationml/2006/main">
   <p:cSld>
+    <p:bg>
+      <p:bgPr>
+        <a:solidFill>
+          <a:schemeClr val="tx1"/>
+        </a:solidFill>
+        <a:effectLst/>
+      </p:bgPr>
+    </p:bg>
     <p:spTree>
       <p:nvGrpSpPr>
         <p:cNvPr id="1" name=""/>
@@ -3443,8 +3484,12 @@
           <a:lstStyle/>
           <a:p>
             <a:r>
-              <a:rPr lang="ko-KR" altLang="en-US" dirty="0"/>
-              <a:t>프로그램 생김새</a:t>
+              <a:rPr lang="ko-KR" altLang="en-US" dirty="0">
+                <a:solidFill>
+                  <a:schemeClr val="bg1"/>
+                </a:solidFill>
+              </a:rPr>
+              <a:t>프로그램 개요</a:t>
             </a:r>
           </a:p>
         </p:txBody>
@@ -3471,62 +3516,65 @@
           <a:lstStyle/>
           <a:p>
             <a:r>
-              <a:rPr lang="en-US" altLang="ko-KR" dirty="0" err="1"/>
-              <a:t>Cmd</a:t>
-            </a:r>
-            <a:r>
-              <a:rPr lang="ko-KR" altLang="en-US" dirty="0"/>
-              <a:t>에서 실행</a:t>
-            </a:r>
-            <a:r>
-              <a:rPr lang="en-US" altLang="ko-KR" dirty="0"/>
-              <a:t>, main </a:t>
-            </a:r>
-            <a:r>
-              <a:rPr lang="ko-KR" altLang="en-US" dirty="0"/>
-              <a:t>함수에 인자 전달하여 폴더 설정</a:t>
-            </a:r>
-            <a:endParaRPr lang="en-US" altLang="ko-KR" dirty="0"/>
-          </a:p>
-          <a:p>
-            <a:r>
-              <a:rPr lang="ko-KR" altLang="en-US" dirty="0"/>
-              <a:t>지향점은 최고속도</a:t>
-            </a:r>
-            <a:endParaRPr lang="en-US" altLang="ko-KR" dirty="0"/>
-          </a:p>
-          <a:p>
-            <a:r>
-              <a:rPr lang="ko-KR" altLang="en-US" dirty="0" err="1"/>
-              <a:t>버블소트가</a:t>
-            </a:r>
-            <a:r>
-              <a:rPr lang="ko-KR" altLang="en-US" dirty="0"/>
-              <a:t> 아닌 다른 정렬 알고리즘 사용하여 정렬</a:t>
-            </a:r>
-            <a:endParaRPr lang="en-US" altLang="ko-KR" dirty="0"/>
-          </a:p>
-          <a:p>
-            <a:r>
-              <a:rPr lang="ko-KR" altLang="en-US" dirty="0"/>
-              <a:t>쓰레드 사용으로 더 </a:t>
-            </a:r>
-            <a:r>
-              <a:rPr lang="ko-KR" altLang="en-US"/>
-              <a:t>빠른 탐색 및 정렬</a:t>
-            </a:r>
-            <a:r>
-              <a:rPr lang="en-US" altLang="ko-KR"/>
-              <a:t>(</a:t>
-            </a:r>
-            <a:r>
-              <a:rPr lang="ko-KR" altLang="en-US" dirty="0"/>
-              <a:t>미정</a:t>
-            </a:r>
-            <a:r>
-              <a:rPr lang="en-US" altLang="ko-KR" dirty="0"/>
-              <a:t>)</a:t>
-            </a:r>
+              <a:rPr lang="ko-KR" altLang="en-US" dirty="0">
+                <a:solidFill>
+                  <a:schemeClr val="bg1"/>
+                </a:solidFill>
+              </a:rPr>
+              <a:t>폴더 내에서 파일을 찾아 정렬하는 프로그램</a:t>
+            </a:r>
+            <a:endParaRPr lang="en-US" altLang="ko-KR" dirty="0">
+              <a:solidFill>
+                <a:schemeClr val="bg1"/>
+              </a:solidFill>
+            </a:endParaRPr>
+          </a:p>
+          <a:p>
+            <a:endParaRPr lang="en-US" altLang="ko-KR" dirty="0">
+              <a:solidFill>
+                <a:schemeClr val="bg1"/>
+              </a:solidFill>
+            </a:endParaRPr>
+          </a:p>
+          <a:p>
+            <a:r>
+              <a:rPr lang="ko-KR" altLang="en-US" dirty="0">
+                <a:solidFill>
+                  <a:schemeClr val="bg1"/>
+                </a:solidFill>
+              </a:rPr>
+              <a:t>지향점은 최고 효율성과 속도</a:t>
+            </a:r>
+            <a:endParaRPr lang="en-US" altLang="ko-KR" dirty="0">
+              <a:solidFill>
+                <a:schemeClr val="bg1"/>
+              </a:solidFill>
+            </a:endParaRPr>
+          </a:p>
+          <a:p>
+            <a:pPr marL="0" indent="0">
+              <a:buNone/>
+            </a:pPr>
+            <a:endParaRPr lang="en-US" altLang="ko-KR" dirty="0">
+              <a:solidFill>
+                <a:schemeClr val="bg1"/>
+              </a:solidFill>
+            </a:endParaRPr>
+          </a:p>
+          <a:p>
+            <a:r>
+              <a:rPr lang="ko-KR" altLang="en-US" dirty="0">
+                <a:solidFill>
+                  <a:schemeClr val="bg1"/>
+                </a:solidFill>
+              </a:rPr>
+              <a:t>가능하다면 스레드 활용</a:t>
+            </a:r>
+            <a:endParaRPr lang="en-US" altLang="ko-KR" dirty="0">
+              <a:solidFill>
+                <a:schemeClr val="bg1"/>
+              </a:solidFill>
+            </a:endParaRPr>
           </a:p>
         </p:txBody>
       </p:sp>
@@ -3546,6 +3594,14 @@
 <file path=ppt/slides/slide3.xml><?xml version="1.0" encoding="utf-8"?>
 <p:sld xmlns:a="http://schemas.openxmlformats.org/drawingml/2006/main" xmlns:r="http://schemas.openxmlformats.org/officeDocument/2006/relationships" xmlns:p="http://schemas.openxmlformats.org/presentationml/2006/main">
   <p:cSld>
+    <p:bg>
+      <p:bgPr>
+        <a:solidFill>
+          <a:schemeClr val="tx1"/>
+        </a:solidFill>
+        <a:effectLst/>
+      </p:bgPr>
+    </p:bg>
     <p:spTree>
       <p:nvGrpSpPr>
         <p:cNvPr id="1" name=""/>
@@ -3565,6 +3621,471 @@
           <p:cNvPr id="2" name="제목 1">
             <a:extLst>
               <a:ext uri="{FF2B5EF4-FFF2-40B4-BE49-F238E27FC236}">
+                <a16:creationId xmlns:a16="http://schemas.microsoft.com/office/drawing/2014/main" id="{C612EE22-EFE7-40DB-ABDD-2C72425FDF56}"/>
+              </a:ext>
+            </a:extLst>
+          </p:cNvPr>
+          <p:cNvSpPr>
+            <a:spLocks noGrp="1"/>
+          </p:cNvSpPr>
+          <p:nvPr>
+            <p:ph type="title"/>
+          </p:nvPr>
+        </p:nvSpPr>
+        <p:spPr/>
+        <p:txBody>
+          <a:bodyPr/>
+          <a:lstStyle/>
+          <a:p>
+            <a:r>
+              <a:rPr lang="ko-KR" altLang="en-US" dirty="0">
+                <a:solidFill>
+                  <a:schemeClr val="bg1"/>
+                </a:solidFill>
+              </a:rPr>
+              <a:t>스레드</a:t>
+            </a:r>
+          </a:p>
+        </p:txBody>
+      </p:sp>
+      <p:sp>
+        <p:nvSpPr>
+          <p:cNvPr id="3" name="내용 개체 틀 2">
+            <a:extLst>
+              <a:ext uri="{FF2B5EF4-FFF2-40B4-BE49-F238E27FC236}">
+                <a16:creationId xmlns:a16="http://schemas.microsoft.com/office/drawing/2014/main" id="{6D7C47EF-E364-4FCA-970E-1D0117BE1C43}"/>
+              </a:ext>
+            </a:extLst>
+          </p:cNvPr>
+          <p:cNvSpPr>
+            <a:spLocks noGrp="1"/>
+          </p:cNvSpPr>
+          <p:nvPr>
+            <p:ph idx="1"/>
+          </p:nvPr>
+        </p:nvSpPr>
+        <p:spPr/>
+        <p:txBody>
+          <a:bodyPr/>
+          <a:lstStyle/>
+          <a:p>
+            <a:r>
+              <a:rPr lang="ko-KR" altLang="en-US" dirty="0">
+                <a:solidFill>
+                  <a:schemeClr val="bg1"/>
+                </a:solidFill>
+              </a:rPr>
+              <a:t>파일 탐색 시</a:t>
+            </a:r>
+            <a:endParaRPr lang="en-US" altLang="ko-KR" dirty="0">
+              <a:solidFill>
+                <a:schemeClr val="bg1"/>
+              </a:solidFill>
+            </a:endParaRPr>
+          </a:p>
+          <a:p>
+            <a:r>
+              <a:rPr lang="ko-KR" altLang="en-US" dirty="0">
+                <a:solidFill>
+                  <a:schemeClr val="bg1"/>
+                </a:solidFill>
+              </a:rPr>
+              <a:t>파일 내용 탐색 시</a:t>
+            </a:r>
+            <a:endParaRPr lang="en-US" altLang="ko-KR" dirty="0">
+              <a:solidFill>
+                <a:schemeClr val="bg1"/>
+              </a:solidFill>
+            </a:endParaRPr>
+          </a:p>
+          <a:p>
+            <a:r>
+              <a:rPr lang="ko-KR" altLang="en-US" dirty="0">
+                <a:solidFill>
+                  <a:schemeClr val="bg1"/>
+                </a:solidFill>
+              </a:rPr>
+              <a:t>정렬 시</a:t>
+            </a:r>
+            <a:endParaRPr lang="en-US" altLang="ko-KR" dirty="0">
+              <a:solidFill>
+                <a:schemeClr val="bg1"/>
+              </a:solidFill>
+            </a:endParaRPr>
+          </a:p>
+          <a:p>
+            <a:endParaRPr lang="en-US" altLang="ko-KR" dirty="0">
+              <a:solidFill>
+                <a:schemeClr val="bg1"/>
+              </a:solidFill>
+            </a:endParaRPr>
+          </a:p>
+          <a:p>
+            <a:r>
+              <a:rPr lang="ko-KR" altLang="en-US" dirty="0">
+                <a:solidFill>
+                  <a:schemeClr val="bg1"/>
+                </a:solidFill>
+              </a:rPr>
+              <a:t>위와 같은 상황에서 더욱 빠르게 작업을 처리하기 위해 활용</a:t>
+            </a:r>
+          </a:p>
+        </p:txBody>
+      </p:sp>
+    </p:spTree>
+    <p:extLst>
+      <p:ext uri="{BB962C8B-B14F-4D97-AF65-F5344CB8AC3E}">
+        <p14:creationId xmlns:p14="http://schemas.microsoft.com/office/powerpoint/2010/main" val="1836123807"/>
+      </p:ext>
+    </p:extLst>
+  </p:cSld>
+  <p:clrMapOvr>
+    <a:masterClrMapping/>
+  </p:clrMapOvr>
+</p:sld>
+</file>
+
+<file path=ppt/slides/slide4.xml><?xml version="1.0" encoding="utf-8"?>
+<p:sld xmlns:a="http://schemas.openxmlformats.org/drawingml/2006/main" xmlns:r="http://schemas.openxmlformats.org/officeDocument/2006/relationships" xmlns:p="http://schemas.openxmlformats.org/presentationml/2006/main">
+  <p:cSld>
+    <p:bg>
+      <p:bgPr>
+        <a:solidFill>
+          <a:schemeClr val="tx1"/>
+        </a:solidFill>
+        <a:effectLst/>
+      </p:bgPr>
+    </p:bg>
+    <p:spTree>
+      <p:nvGrpSpPr>
+        <p:cNvPr id="1" name=""/>
+        <p:cNvGrpSpPr/>
+        <p:nvPr/>
+      </p:nvGrpSpPr>
+      <p:grpSpPr>
+        <a:xfrm>
+          <a:off x="0" y="0"/>
+          <a:ext cx="0" cy="0"/>
+          <a:chOff x="0" y="0"/>
+          <a:chExt cx="0" cy="0"/>
+        </a:xfrm>
+      </p:grpSpPr>
+      <p:sp>
+        <p:nvSpPr>
+          <p:cNvPr id="2" name="제목 1">
+            <a:extLst>
+              <a:ext uri="{FF2B5EF4-FFF2-40B4-BE49-F238E27FC236}">
+                <a16:creationId xmlns:a16="http://schemas.microsoft.com/office/drawing/2014/main" id="{4F63AE26-49FE-47D4-BE4C-BFA6B8AB82AE}"/>
+              </a:ext>
+            </a:extLst>
+          </p:cNvPr>
+          <p:cNvSpPr>
+            <a:spLocks noGrp="1"/>
+          </p:cNvSpPr>
+          <p:nvPr>
+            <p:ph type="title"/>
+          </p:nvPr>
+        </p:nvSpPr>
+        <p:spPr/>
+        <p:txBody>
+          <a:bodyPr/>
+          <a:lstStyle/>
+          <a:p>
+            <a:r>
+              <a:rPr lang="ko-KR" altLang="en-US" dirty="0">
+                <a:solidFill>
+                  <a:schemeClr val="bg1"/>
+                </a:solidFill>
+              </a:rPr>
+              <a:t>정렬</a:t>
+            </a:r>
+          </a:p>
+        </p:txBody>
+      </p:sp>
+      <mc:AlternateContent xmlns:mc="http://schemas.openxmlformats.org/markup-compatibility/2006">
+        <mc:Choice xmlns:a14="http://schemas.microsoft.com/office/drawing/2010/main" Requires="a14">
+          <p:sp>
+            <p:nvSpPr>
+              <p:cNvPr id="3" name="내용 개체 틀 2">
+                <a:extLst>
+                  <a:ext uri="{FF2B5EF4-FFF2-40B4-BE49-F238E27FC236}">
+                    <a16:creationId xmlns:a16="http://schemas.microsoft.com/office/drawing/2014/main" id="{B39CF30A-47F1-4DCD-8F30-194F0E76F2A4}"/>
+                  </a:ext>
+                </a:extLst>
+              </p:cNvPr>
+              <p:cNvSpPr>
+                <a:spLocks noGrp="1"/>
+              </p:cNvSpPr>
+              <p:nvPr>
+                <p:ph idx="1"/>
+              </p:nvPr>
+            </p:nvSpPr>
+            <p:spPr/>
+            <p:txBody>
+              <a:bodyPr/>
+              <a:lstStyle/>
+              <a:p>
+                <a:r>
+                  <a:rPr lang="ko-KR" altLang="en-US" dirty="0">
+                    <a:solidFill>
+                      <a:schemeClr val="bg1"/>
+                    </a:solidFill>
+                  </a:rPr>
+                  <a:t>버블 정렬은 시간 복잡도가</a:t>
+                </a:r>
+                <a14:m>
+                  <m:oMath xmlns:m="http://schemas.openxmlformats.org/officeDocument/2006/math">
+                    <m:r>
+                      <a:rPr lang="en-US" altLang="ko-KR" b="0" i="0" smtClean="0">
+                        <a:solidFill>
+                          <a:schemeClr val="bg1"/>
+                        </a:solidFill>
+                        <a:latin typeface="Cambria Math" panose="02040503050406030204" pitchFamily="18" charset="0"/>
+                      </a:rPr>
+                      <m:t> </m:t>
+                    </m:r>
+                    <m:r>
+                      <a:rPr lang="en-US" altLang="ko-KR" b="0" i="1" smtClean="0">
+                        <a:solidFill>
+                          <a:schemeClr val="bg1"/>
+                        </a:solidFill>
+                        <a:latin typeface="Cambria Math" panose="02040503050406030204" pitchFamily="18" charset="0"/>
+                      </a:rPr>
+                      <m:t>𝑂</m:t>
+                    </m:r>
+                    <m:d>
+                      <m:dPr>
+                        <m:ctrlPr>
+                          <a:rPr lang="en-US" altLang="ko-KR" b="0" i="1" smtClean="0">
+                            <a:solidFill>
+                              <a:schemeClr val="bg1"/>
+                            </a:solidFill>
+                            <a:latin typeface="Cambria Math" panose="02040503050406030204" pitchFamily="18" charset="0"/>
+                          </a:rPr>
+                        </m:ctrlPr>
+                      </m:dPr>
+                      <m:e>
+                        <m:sSup>
+                          <m:sSupPr>
+                            <m:ctrlPr>
+                              <a:rPr lang="en-US" altLang="ko-KR" b="0" i="1" smtClean="0">
+                                <a:solidFill>
+                                  <a:schemeClr val="bg1"/>
+                                </a:solidFill>
+                                <a:latin typeface="Cambria Math" panose="02040503050406030204" pitchFamily="18" charset="0"/>
+                              </a:rPr>
+                            </m:ctrlPr>
+                          </m:sSupPr>
+                          <m:e>
+                            <m:r>
+                              <a:rPr lang="en-US" altLang="ko-KR" b="0" i="1" smtClean="0">
+                                <a:solidFill>
+                                  <a:schemeClr val="bg1"/>
+                                </a:solidFill>
+                                <a:latin typeface="Cambria Math" panose="02040503050406030204" pitchFamily="18" charset="0"/>
+                              </a:rPr>
+                              <m:t>𝑛</m:t>
+                            </m:r>
+                          </m:e>
+                          <m:sup>
+                            <m:r>
+                              <a:rPr lang="en-US" altLang="ko-KR" b="0" i="1" smtClean="0">
+                                <a:solidFill>
+                                  <a:schemeClr val="bg1"/>
+                                </a:solidFill>
+                                <a:latin typeface="Cambria Math" panose="02040503050406030204" pitchFamily="18" charset="0"/>
+                              </a:rPr>
+                              <m:t>2</m:t>
+                            </m:r>
+                          </m:sup>
+                        </m:sSup>
+                      </m:e>
+                    </m:d>
+                    <m:r>
+                      <a:rPr lang="ko-KR" altLang="en-US" i="1">
+                        <a:solidFill>
+                          <a:schemeClr val="bg1"/>
+                        </a:solidFill>
+                        <a:latin typeface="Cambria Math" panose="02040503050406030204" pitchFamily="18" charset="0"/>
+                      </a:rPr>
+                      <m:t>로</m:t>
+                    </m:r>
+                  </m:oMath>
+                </a14:m>
+                <a:r>
+                  <a:rPr lang="ko-KR" altLang="en-US" dirty="0">
+                    <a:solidFill>
+                      <a:schemeClr val="bg1"/>
+                    </a:solidFill>
+                  </a:rPr>
+                  <a:t> 매우 비효율적</a:t>
+                </a:r>
+                <a:r>
+                  <a:rPr lang="en-US" altLang="ko-KR" dirty="0">
+                    <a:solidFill>
+                      <a:schemeClr val="bg1"/>
+                    </a:solidFill>
+                  </a:rPr>
+                  <a:t>.</a:t>
+                </a:r>
+              </a:p>
+              <a:p>
+                <a:endParaRPr lang="en-US" altLang="ko-KR" dirty="0">
+                  <a:solidFill>
+                    <a:schemeClr val="bg1"/>
+                  </a:solidFill>
+                </a:endParaRPr>
+              </a:p>
+              <a:p>
+                <a:r>
+                  <a:rPr lang="ko-KR" altLang="en-US" dirty="0">
+                    <a:solidFill>
+                      <a:schemeClr val="bg1"/>
+                    </a:solidFill>
+                  </a:rPr>
+                  <a:t>그러므로 더 효율적으로 정렬하기 위해 다른 알고리즘 사용</a:t>
+                </a:r>
+                <a:r>
+                  <a:rPr lang="en-US" altLang="ko-KR" dirty="0">
+                    <a:solidFill>
+                      <a:schemeClr val="bg1"/>
+                    </a:solidFill>
+                  </a:rPr>
+                  <a:t>.</a:t>
+                </a:r>
+              </a:p>
+              <a:p>
+                <a:endParaRPr lang="en-US" altLang="ko-KR" dirty="0">
+                  <a:solidFill>
+                    <a:schemeClr val="bg1"/>
+                  </a:solidFill>
+                </a:endParaRPr>
+              </a:p>
+              <a:p>
+                <a:r>
+                  <a:rPr lang="ko-KR" altLang="en-US" dirty="0">
+                    <a:solidFill>
+                      <a:schemeClr val="bg1"/>
+                    </a:solidFill>
+                  </a:rPr>
+                  <a:t>정렬 기준</a:t>
+                </a:r>
+                <a:r>
+                  <a:rPr lang="en-US" altLang="ko-KR" dirty="0">
+                    <a:solidFill>
+                      <a:schemeClr val="bg1"/>
+                    </a:solidFill>
+                  </a:rPr>
+                  <a:t>: </a:t>
+                </a:r>
+                <a:r>
+                  <a:rPr lang="ko-KR" altLang="en-US" dirty="0">
+                    <a:solidFill>
+                      <a:schemeClr val="bg1"/>
+                    </a:solidFill>
+                  </a:rPr>
+                  <a:t>단어 등장 횟수</a:t>
+                </a:r>
+                <a:r>
+                  <a:rPr lang="en-US" altLang="ko-KR">
+                    <a:solidFill>
+                      <a:schemeClr val="bg1"/>
+                    </a:solidFill>
+                  </a:rPr>
+                  <a:t>(?)</a:t>
+                </a:r>
+                <a:endParaRPr lang="ko-KR" altLang="en-US" dirty="0">
+                  <a:solidFill>
+                    <a:schemeClr val="bg1"/>
+                  </a:solidFill>
+                </a:endParaRPr>
+              </a:p>
+            </p:txBody>
+          </p:sp>
+        </mc:Choice>
+        <mc:Fallback>
+          <p:sp>
+            <p:nvSpPr>
+              <p:cNvPr id="3" name="내용 개체 틀 2">
+                <a:extLst>
+                  <a:ext uri="{FF2B5EF4-FFF2-40B4-BE49-F238E27FC236}">
+                    <a16:creationId xmlns:a16="http://schemas.microsoft.com/office/drawing/2014/main" id="{B39CF30A-47F1-4DCD-8F30-194F0E76F2A4}"/>
+                  </a:ext>
+                </a:extLst>
+              </p:cNvPr>
+              <p:cNvSpPr>
+                <a:spLocks noGrp="1" noRot="1" noChangeAspect="1" noMove="1" noResize="1" noEditPoints="1" noAdjustHandles="1" noChangeArrowheads="1" noChangeShapeType="1" noTextEdit="1"/>
+              </p:cNvSpPr>
+              <p:nvPr>
+                <p:ph idx="1"/>
+              </p:nvPr>
+            </p:nvSpPr>
+            <p:spPr>
+              <a:blipFill>
+                <a:blip r:embed="rId2"/>
+                <a:stretch>
+                  <a:fillRect l="-1043" t="-2381"/>
+                </a:stretch>
+              </a:blipFill>
+            </p:spPr>
+            <p:txBody>
+              <a:bodyPr/>
+              <a:lstStyle/>
+              <a:p>
+                <a:r>
+                  <a:rPr lang="ko-KR" altLang="en-US">
+                    <a:noFill/>
+                  </a:rPr>
+                  <a:t> </a:t>
+                </a:r>
+              </a:p>
+            </p:txBody>
+          </p:sp>
+        </mc:Fallback>
+      </mc:AlternateContent>
+    </p:spTree>
+    <p:extLst>
+      <p:ext uri="{BB962C8B-B14F-4D97-AF65-F5344CB8AC3E}">
+        <p14:creationId xmlns:p14="http://schemas.microsoft.com/office/powerpoint/2010/main" val="2852251902"/>
+      </p:ext>
+    </p:extLst>
+  </p:cSld>
+  <p:clrMapOvr>
+    <a:masterClrMapping/>
+  </p:clrMapOvr>
+</p:sld>
+</file>
+
+<file path=ppt/slides/slide5.xml><?xml version="1.0" encoding="utf-8"?>
+<p:sld xmlns:a="http://schemas.openxmlformats.org/drawingml/2006/main" xmlns:r="http://schemas.openxmlformats.org/officeDocument/2006/relationships" xmlns:p="http://schemas.openxmlformats.org/presentationml/2006/main">
+  <p:cSld>
+    <p:bg>
+      <p:bgPr>
+        <a:solidFill>
+          <a:schemeClr val="tx1"/>
+        </a:solidFill>
+        <a:effectLst/>
+      </p:bgPr>
+    </p:bg>
+    <p:spTree>
+      <p:nvGrpSpPr>
+        <p:cNvPr id="1" name=""/>
+        <p:cNvGrpSpPr/>
+        <p:nvPr/>
+      </p:nvGrpSpPr>
+      <p:grpSpPr>
+        <a:xfrm>
+          <a:off x="0" y="0"/>
+          <a:ext cx="0" cy="0"/>
+          <a:chOff x="0" y="0"/>
+          <a:chExt cx="0" cy="0"/>
+        </a:xfrm>
+      </p:grpSpPr>
+      <p:sp>
+        <p:nvSpPr>
+          <p:cNvPr id="2" name="제목 1">
+            <a:extLst>
+              <a:ext uri="{FF2B5EF4-FFF2-40B4-BE49-F238E27FC236}">
                 <a16:creationId xmlns:a16="http://schemas.microsoft.com/office/drawing/2014/main" id="{5CADFFE5-15F5-4E0E-A863-6F1A6CC47B00}"/>
               </a:ext>
             </a:extLst>
@@ -3582,8 +4103,12 @@
           <a:lstStyle/>
           <a:p>
             <a:r>
-              <a:rPr lang="ko-KR" altLang="en-US" dirty="0"/>
-              <a:t>앞으로 할 것들</a:t>
+              <a:rPr lang="ko-KR" altLang="en-US" dirty="0">
+                <a:solidFill>
+                  <a:schemeClr val="bg1"/>
+                </a:solidFill>
+              </a:rPr>
+              <a:t>제작 계획</a:t>
             </a:r>
           </a:p>
         </p:txBody>
@@ -3610,31 +4135,96 @@
           <a:lstStyle/>
           <a:p>
             <a:r>
-              <a:rPr lang="ko-KR" altLang="en-US" dirty="0"/>
-              <a:t>정렬 알고리즘 공부</a:t>
-            </a:r>
-            <a:endParaRPr lang="en-US" altLang="ko-KR" dirty="0"/>
-          </a:p>
-          <a:p>
-            <a:r>
-              <a:rPr lang="en-US" altLang="ko-KR" dirty="0" err="1"/>
-              <a:t>Process.h</a:t>
-            </a:r>
-            <a:r>
-              <a:rPr lang="en-US" altLang="ko-KR" dirty="0"/>
-              <a:t>(</a:t>
-            </a:r>
-            <a:r>
-              <a:rPr lang="ko-KR" altLang="en-US" dirty="0"/>
-              <a:t>쓰레드 헤더파일</a:t>
-            </a:r>
-            <a:r>
-              <a:rPr lang="en-US" altLang="ko-KR" dirty="0"/>
-              <a:t>) </a:t>
-            </a:r>
-            <a:r>
-              <a:rPr lang="ko-KR" altLang="en-US" dirty="0"/>
-              <a:t>공부</a:t>
+              <a:rPr lang="ko-KR" altLang="en-US" dirty="0">
+                <a:solidFill>
+                  <a:schemeClr val="bg1"/>
+                </a:solidFill>
+              </a:rPr>
+              <a:t>정렬 알고리즘 공부 후 프로그램에 적용</a:t>
+            </a:r>
+            <a:endParaRPr lang="en-US" altLang="ko-KR" dirty="0">
+              <a:solidFill>
+                <a:schemeClr val="bg1"/>
+              </a:solidFill>
+            </a:endParaRPr>
+          </a:p>
+          <a:p>
+            <a:endParaRPr lang="en-US" altLang="ko-KR" dirty="0">
+              <a:solidFill>
+                <a:schemeClr val="bg1"/>
+              </a:solidFill>
+            </a:endParaRPr>
+          </a:p>
+          <a:p>
+            <a:r>
+              <a:rPr lang="ko-KR" altLang="en-US" dirty="0">
+                <a:solidFill>
+                  <a:schemeClr val="bg1"/>
+                </a:solidFill>
+              </a:rPr>
+              <a:t>쓰레드 사용법 공부 후 적용</a:t>
+            </a:r>
+            <a:endParaRPr lang="en-US" altLang="ko-KR" dirty="0">
+              <a:solidFill>
+                <a:schemeClr val="bg1"/>
+              </a:solidFill>
+            </a:endParaRPr>
+          </a:p>
+          <a:p>
+            <a:endParaRPr lang="en-US" altLang="ko-KR" dirty="0">
+              <a:solidFill>
+                <a:schemeClr val="bg1"/>
+              </a:solidFill>
+            </a:endParaRPr>
+          </a:p>
+          <a:p>
+            <a:r>
+              <a:rPr lang="ko-KR" altLang="en-US" dirty="0">
+                <a:solidFill>
+                  <a:schemeClr val="bg1"/>
+                </a:solidFill>
+              </a:rPr>
+              <a:t>이를 위해 </a:t>
+            </a:r>
+            <a:r>
+              <a:rPr lang="en-US" altLang="ko-KR" dirty="0" err="1">
+                <a:solidFill>
+                  <a:schemeClr val="bg1"/>
+                </a:solidFill>
+              </a:rPr>
+              <a:t>process.h</a:t>
+            </a:r>
+            <a:r>
+              <a:rPr lang="en-US" altLang="ko-KR" dirty="0">
+                <a:solidFill>
+                  <a:schemeClr val="bg1"/>
+                </a:solidFill>
+              </a:rPr>
+              <a:t>, </a:t>
+            </a:r>
+            <a:r>
+              <a:rPr lang="en-US" altLang="ko-KR" dirty="0" err="1">
+                <a:solidFill>
+                  <a:schemeClr val="bg1"/>
+                </a:solidFill>
+              </a:rPr>
+              <a:t>algorithm.h</a:t>
+            </a:r>
+            <a:r>
+              <a:rPr lang="en-US" altLang="ko-KR" dirty="0">
+                <a:solidFill>
+                  <a:schemeClr val="bg1"/>
+                </a:solidFill>
+              </a:rPr>
+              <a:t> </a:t>
+            </a:r>
+            <a:r>
+              <a:rPr lang="ko-KR" altLang="en-US" dirty="0">
+                <a:solidFill>
+                  <a:schemeClr val="bg1"/>
+                </a:solidFill>
+              </a:rPr>
+              <a:t>등의 헤더 파일 활용법 공부</a:t>
             </a:r>
           </a:p>
         </p:txBody>

</xml_diff>